<commit_message>
Adding IO code and tests
</commit_message>
<xml_diff>
--- a/Console Testing.pptx
+++ b/Console Testing.pptx
@@ -20761,7 +20761,18 @@
             </a:r>
             <a:r>
               <a:rPr lang="en-US" baseline="0" dirty="0"/>
-              <a:t> provided by a method you just need to know what should be coming from the method and build a String that matches</a:t>
+              <a:t> provided by a method you just need to know what should be coming from the method and build a </a:t>
+            </a:r>
+            <a:r>
+              <a:rPr lang="en-US" b="1" baseline="0" dirty="0">
+                <a:latin typeface="Courier New" panose="02070309020205020404" pitchFamily="49" charset="0"/>
+                <a:cs typeface="Courier New" panose="02070309020205020404" pitchFamily="49" charset="0"/>
+              </a:rPr>
+              <a:t>String</a:t>
+            </a:r>
+            <a:r>
+              <a:rPr lang="en-US" baseline="0" dirty="0"/>
+              <a:t> that matches</a:t>
             </a:r>
           </a:p>
           <a:p>
@@ -20770,7 +20781,10 @@
               <a:t>Create a </a:t>
             </a:r>
             <a:r>
-              <a:rPr lang="en-US" dirty="0" err="1"/>
+              <a:rPr lang="en-US" b="1" dirty="0" err="1">
+                <a:latin typeface="Courier New" panose="02070309020205020404" pitchFamily="49" charset="0"/>
+                <a:cs typeface="Courier New" panose="02070309020205020404" pitchFamily="49" charset="0"/>
+              </a:rPr>
               <a:t>ByteArrayOutputStream</a:t>
             </a:r>
             <a:r>
@@ -20778,12 +20792,22 @@
               <a:t> and send it as the parameter to initialize a </a:t>
             </a:r>
             <a:r>
-              <a:rPr lang="en-US" dirty="0" err="1"/>
+              <a:rPr lang="en-US" b="1" dirty="0" err="1">
+                <a:latin typeface="Courier New" panose="02070309020205020404" pitchFamily="49" charset="0"/>
+                <a:cs typeface="Courier New" panose="02070309020205020404" pitchFamily="49" charset="0"/>
+              </a:rPr>
               <a:t>PrintStream</a:t>
             </a:r>
             <a:r>
               <a:rPr lang="en-US" dirty="0"/>
-              <a:t>, setting it as the output for System</a:t>
+              <a:t>, setting it as the output for </a:t>
+            </a:r>
+            <a:r>
+              <a:rPr lang="en-US" b="1" dirty="0">
+                <a:latin typeface="Courier New" panose="02070309020205020404" pitchFamily="49" charset="0"/>
+                <a:cs typeface="Courier New" panose="02070309020205020404" pitchFamily="49" charset="0"/>
+              </a:rPr>
+              <a:t>System</a:t>
             </a:r>
           </a:p>
           <a:p>
@@ -20806,12 +20830,27 @@
               <a:t> streams </a:t>
             </a:r>
             <a:r>
-              <a:rPr lang="en-US" dirty="0" err="1"/>
+              <a:rPr lang="en-US" b="1" dirty="0" err="1"/>
               <a:t>toString</a:t>
             </a:r>
             <a:r>
+              <a:rPr lang="en-US" b="1" dirty="0"/>
+              <a:t>()</a:t>
+            </a:r>
+            <a:r>
               <a:rPr lang="en-US" dirty="0"/>
-              <a:t>() to a String variable</a:t>
+              <a:t> to a </a:t>
+            </a:r>
+            <a:r>
+              <a:rPr lang="en-US" b="1" dirty="0">
+                <a:latin typeface="Courier New" panose="02070309020205020404" pitchFamily="49" charset="0"/>
+                <a:cs typeface="Courier New" panose="02070309020205020404" pitchFamily="49" charset="0"/>
+              </a:rPr>
+              <a:t>String</a:t>
+            </a:r>
+            <a:r>
+              <a:rPr lang="en-US" dirty="0"/>
+              <a:t> variable</a:t>
             </a:r>
           </a:p>
           <a:p>
@@ -20824,7 +20863,10 @@
               <a:t> the </a:t>
             </a:r>
             <a:r>
-              <a:rPr lang="en-US" dirty="0" err="1"/>
+              <a:rPr lang="en-US" b="1" dirty="0" err="1">
+                <a:latin typeface="Courier New" panose="02070309020205020404" pitchFamily="49" charset="0"/>
+                <a:cs typeface="Courier New" panose="02070309020205020404" pitchFamily="49" charset="0"/>
+              </a:rPr>
               <a:t>assertEquals</a:t>
             </a:r>
             <a:r>
@@ -21045,10 +21087,24 @@
           <a:p>
             <a:r>
               <a:rPr lang="en-US" dirty="0"/>
-              <a:t>First build an input String and initialize a </a:t>
+              <a:t>First build an input </a:t>
             </a:r>
             <a:r>
-              <a:rPr lang="en-US" dirty="0" err="1"/>
+              <a:rPr lang="en-US" b="1" dirty="0">
+                <a:latin typeface="Courier New" panose="02070309020205020404" pitchFamily="49" charset="0"/>
+                <a:cs typeface="Courier New" panose="02070309020205020404" pitchFamily="49" charset="0"/>
+              </a:rPr>
+              <a:t>String</a:t>
+            </a:r>
+            <a:r>
+              <a:rPr lang="en-US" dirty="0"/>
+              <a:t> and initialize a </a:t>
+            </a:r>
+            <a:r>
+              <a:rPr lang="en-US" b="1" dirty="0" err="1">
+                <a:latin typeface="Courier New" panose="02070309020205020404" pitchFamily="49" charset="0"/>
+                <a:cs typeface="Courier New" panose="02070309020205020404" pitchFamily="49" charset="0"/>
+              </a:rPr>
               <a:t>ByteInputStream</a:t>
             </a:r>
             <a:r>
@@ -21056,25 +21112,48 @@
               <a:t> from the </a:t>
             </a:r>
             <a:r>
-              <a:rPr lang="en-US" baseline="0" dirty="0" err="1"/>
+              <a:rPr lang="en-US" b="1" baseline="0" dirty="0" err="1"/>
               <a:t>getBytes</a:t>
             </a:r>
             <a:r>
               <a:rPr lang="en-US" baseline="0" dirty="0"/>
-              <a:t> of the String</a:t>
+              <a:t> of the </a:t>
+            </a:r>
+            <a:r>
+              <a:rPr lang="en-US" b="1" baseline="0" dirty="0"/>
+              <a:t>String</a:t>
             </a:r>
           </a:p>
           <a:p>
             <a:r>
               <a:rPr lang="en-US" dirty="0"/>
-              <a:t>Set the stream as the System input</a:t>
+              <a:t>Set the stream as the </a:t>
+            </a:r>
+            <a:r>
+              <a:rPr lang="en-US" b="1" dirty="0"/>
+              <a:t>System</a:t>
+            </a:r>
+            <a:r>
+              <a:rPr lang="en-US" dirty="0"/>
+              <a:t> input</a:t>
             </a:r>
             <a:endParaRPr lang="en-US" baseline="0" dirty="0"/>
           </a:p>
           <a:p>
             <a:r>
               <a:rPr lang="en-US" baseline="0" dirty="0"/>
-              <a:t>Re-initialize the tested object since the Scanner </a:t>
+              <a:t>Re-initialize the tested object since the </a:t>
+            </a:r>
+            <a:r>
+              <a:rPr lang="en-US" b="1" baseline="0" dirty="0">
+                <a:latin typeface="Courier New" panose="02070309020205020404" pitchFamily="49" charset="0"/>
+                <a:cs typeface="Courier New" panose="02070309020205020404" pitchFamily="49" charset="0"/>
+              </a:rPr>
+              <a:t>Scanner</a:t>
+            </a:r>
+            <a:r>
+              <a:rPr lang="en-US" baseline="0" dirty="0"/>
+              <a:t> </a:t>
             </a:r>
             <a:r>
               <a:rPr lang="en-US" dirty="0"/>
@@ -21274,10 +21353,29 @@
           <a:p>
             <a:r>
               <a:rPr lang="en-US" dirty="0"/>
-              <a:t>To test a conversation based method you will need to build the responses in advance as a String and then set the bytes of that String to the source for the </a:t>
+              <a:t>To test a conversation based method you will need to build the responses in advance as a </a:t>
             </a:r>
             <a:r>
-              <a:rPr lang="en-US" dirty="0" err="1"/>
+              <a:rPr lang="en-US" b="1" dirty="0">
+                <a:latin typeface="Courier New" panose="02070309020205020404" pitchFamily="49" charset="0"/>
+                <a:cs typeface="Courier New" panose="02070309020205020404" pitchFamily="49" charset="0"/>
+              </a:rPr>
+              <a:t>String</a:t>
+            </a:r>
+            <a:r>
+              <a:rPr lang="en-US" dirty="0"/>
+              <a:t> and then set the bytes of that </a:t>
+            </a:r>
+            <a:r>
+              <a:rPr lang="en-US" b="1" dirty="0"/>
+              <a:t>String</a:t>
+            </a:r>
+            <a:r>
+              <a:rPr lang="en-US" dirty="0"/>
+              <a:t> to the source for the </a:t>
+            </a:r>
+            <a:r>
+              <a:rPr lang="en-US" b="1" dirty="0" err="1"/>
               <a:t>InputStream</a:t>
             </a:r>
             <a:r>
@@ -21285,51 +21383,79 @@
               <a:t> and then tell the System that that is now the stream for </a:t>
             </a:r>
             <a:r>
-              <a:rPr lang="en-US" dirty="0" err="1"/>
+              <a:rPr lang="en-US" b="1" dirty="0" err="1">
+                <a:latin typeface="Courier New" panose="02070309020205020404" pitchFamily="49" charset="0"/>
+                <a:cs typeface="Courier New" panose="02070309020205020404" pitchFamily="49" charset="0"/>
+              </a:rPr>
               <a:t>System.in</a:t>
             </a:r>
-            <a:endParaRPr lang="en-US" dirty="0"/>
+            <a:endParaRPr lang="en-US" b="1" dirty="0">
+              <a:latin typeface="Courier New" panose="02070309020205020404" pitchFamily="49" charset="0"/>
+              <a:cs typeface="Courier New" panose="02070309020205020404" pitchFamily="49" charset="0"/>
+            </a:endParaRPr>
           </a:p>
           <a:p>
             <a:r>
               <a:rPr lang="en-US" dirty="0"/>
-              <a:t>I recommend keeping these fairly simple as it will bloat easily. You will want to make sure your students understand the impact that a call to .next()/</a:t>
+              <a:t>I recommend keeping these fairly simple as it will bloat easily. You will want to make sure your students understand the impact that a call to </a:t>
             </a:r>
             <a:r>
-              <a:rPr lang="en-US" dirty="0" err="1"/>
+              <a:rPr lang="en-US" b="1" dirty="0"/>
+              <a:t>.next()/</a:t>
+            </a:r>
+            <a:r>
+              <a:rPr lang="en-US" b="1" dirty="0" err="1"/>
               <a:t>nextInt</a:t>
             </a:r>
             <a:r>
-              <a:rPr lang="en-US" dirty="0"/>
+              <a:rPr lang="en-US" b="1" dirty="0"/>
               <a:t>()/</a:t>
             </a:r>
             <a:r>
-              <a:rPr lang="en-US" dirty="0" err="1"/>
+              <a:rPr lang="en-US" b="1" dirty="0" err="1"/>
               <a:t>nextDouble</a:t>
             </a:r>
             <a:r>
-              <a:rPr lang="en-US" dirty="0"/>
-              <a:t>() have compared to a call to .</a:t>
+              <a:rPr lang="en-US" b="1" dirty="0"/>
+              <a:t>()</a:t>
             </a:r>
             <a:r>
-              <a:rPr lang="en-US" dirty="0" err="1"/>
+              <a:rPr lang="en-US" dirty="0"/>
+              <a:t> have compared to a call to .</a:t>
+            </a:r>
+            <a:r>
+              <a:rPr lang="en-US" b="1" dirty="0" err="1"/>
               <a:t>nextLine</a:t>
             </a:r>
             <a:r>
-              <a:rPr lang="en-US" dirty="0"/>
+              <a:rPr lang="en-US" b="1" dirty="0"/>
               <a:t>()</a:t>
             </a:r>
           </a:p>
           <a:p>
             <a:r>
               <a:rPr lang="en-US" dirty="0"/>
-              <a:t>Remember to end with a \n if your statements are based on </a:t>
+              <a:t>Remember to end each with a </a:t>
             </a:r>
             <a:r>
-              <a:rPr lang="en-US" dirty="0" err="1"/>
+              <a:rPr lang="en-US" b="1" dirty="0"/>
+              <a:t>\n</a:t>
+            </a:r>
+            <a:r>
+              <a:rPr lang="en-US" dirty="0"/>
+              <a:t> if your statements are based on </a:t>
+            </a:r>
+            <a:r>
+              <a:rPr lang="en-US" b="1" dirty="0" err="1">
+                <a:latin typeface="Courier New" panose="02070309020205020404" pitchFamily="49" charset="0"/>
+                <a:cs typeface="Courier New" panose="02070309020205020404" pitchFamily="49" charset="0"/>
+              </a:rPr>
               <a:t>println</a:t>
             </a:r>
-            <a:endParaRPr lang="en-US" dirty="0"/>
+            <a:endParaRPr lang="en-US" b="1" dirty="0">
+              <a:latin typeface="Courier New" panose="02070309020205020404" pitchFamily="49" charset="0"/>
+              <a:cs typeface="Courier New" panose="02070309020205020404" pitchFamily="49" charset="0"/>
+            </a:endParaRPr>
           </a:p>
         </p:txBody>
       </p:sp>

</xml_diff>